<commit_message>
ch 3 slides fix
</commit_message>
<xml_diff>
--- a/slides/figures/fig_three_spreads.pptx
+++ b/slides/figures/fig_three_spreads.pptx
@@ -154,7 +154,7 @@
           </a:lstStyle>
           <a:p>
             <a:r>
-              <a:rPr lang="en-US" smtClean="0"/>
+              <a:rPr lang="en-US"/>
               <a:t>Click to edit Master title style</a:t>
             </a:r>
             <a:endParaRPr lang="en-US" dirty="0"/>
@@ -219,7 +219,7 @@
           </a:lstStyle>
           <a:p>
             <a:r>
-              <a:rPr lang="en-US" smtClean="0"/>
+              <a:rPr lang="en-US"/>
               <a:t>Click to edit Master subtitle style</a:t>
             </a:r>
             <a:endParaRPr lang="en-US" dirty="0"/>
@@ -243,7 +243,7 @@
           <a:p>
             <a:fld id="{44B83135-4B8F-DD4B-A04C-E41F45709654}" type="datetimeFigureOut">
               <a:rPr lang="en-US" smtClean="0"/>
-              <a:t>1/23/18</a:t>
+              <a:t>1/24/2022</a:t>
             </a:fld>
             <a:endParaRPr lang="en-US"/>
           </a:p>
@@ -332,7 +332,7 @@
           <a:lstStyle/>
           <a:p>
             <a:r>
-              <a:rPr lang="en-US" smtClean="0"/>
+              <a:rPr lang="en-US"/>
               <a:t>Click to edit Master title style</a:t>
             </a:r>
             <a:endParaRPr lang="en-US" dirty="0"/>
@@ -356,35 +356,35 @@
           <a:p>
             <a:pPr lvl="0"/>
             <a:r>
-              <a:rPr lang="en-US" smtClean="0"/>
+              <a:rPr lang="en-US"/>
               <a:t>Click to edit Master text styles</a:t>
             </a:r>
           </a:p>
           <a:p>
             <a:pPr lvl="1"/>
             <a:r>
-              <a:rPr lang="en-US" smtClean="0"/>
+              <a:rPr lang="en-US"/>
               <a:t>Second level</a:t>
             </a:r>
           </a:p>
           <a:p>
             <a:pPr lvl="2"/>
             <a:r>
-              <a:rPr lang="en-US" smtClean="0"/>
+              <a:rPr lang="en-US"/>
               <a:t>Third level</a:t>
             </a:r>
           </a:p>
           <a:p>
             <a:pPr lvl="3"/>
             <a:r>
-              <a:rPr lang="en-US" smtClean="0"/>
+              <a:rPr lang="en-US"/>
               <a:t>Fourth level</a:t>
             </a:r>
           </a:p>
           <a:p>
             <a:pPr lvl="4"/>
             <a:r>
-              <a:rPr lang="en-US" smtClean="0"/>
+              <a:rPr lang="en-US"/>
               <a:t>Fifth level</a:t>
             </a:r>
             <a:endParaRPr lang="en-US" dirty="0"/>
@@ -408,7 +408,7 @@
           <a:p>
             <a:fld id="{44B83135-4B8F-DD4B-A04C-E41F45709654}" type="datetimeFigureOut">
               <a:rPr lang="en-US" smtClean="0"/>
-              <a:t>1/23/18</a:t>
+              <a:t>1/24/2022</a:t>
             </a:fld>
             <a:endParaRPr lang="en-US"/>
           </a:p>
@@ -502,7 +502,7 @@
           <a:lstStyle/>
           <a:p>
             <a:r>
-              <a:rPr lang="en-US" smtClean="0"/>
+              <a:rPr lang="en-US"/>
               <a:t>Click to edit Master title style</a:t>
             </a:r>
             <a:endParaRPr lang="en-US" dirty="0"/>
@@ -531,35 +531,35 @@
           <a:p>
             <a:pPr lvl="0"/>
             <a:r>
-              <a:rPr lang="en-US" smtClean="0"/>
+              <a:rPr lang="en-US"/>
               <a:t>Click to edit Master text styles</a:t>
             </a:r>
           </a:p>
           <a:p>
             <a:pPr lvl="1"/>
             <a:r>
-              <a:rPr lang="en-US" smtClean="0"/>
+              <a:rPr lang="en-US"/>
               <a:t>Second level</a:t>
             </a:r>
           </a:p>
           <a:p>
             <a:pPr lvl="2"/>
             <a:r>
-              <a:rPr lang="en-US" smtClean="0"/>
+              <a:rPr lang="en-US"/>
               <a:t>Third level</a:t>
             </a:r>
           </a:p>
           <a:p>
             <a:pPr lvl="3"/>
             <a:r>
-              <a:rPr lang="en-US" smtClean="0"/>
+              <a:rPr lang="en-US"/>
               <a:t>Fourth level</a:t>
             </a:r>
           </a:p>
           <a:p>
             <a:pPr lvl="4"/>
             <a:r>
-              <a:rPr lang="en-US" smtClean="0"/>
+              <a:rPr lang="en-US"/>
               <a:t>Fifth level</a:t>
             </a:r>
             <a:endParaRPr lang="en-US" dirty="0"/>
@@ -583,7 +583,7 @@
           <a:p>
             <a:fld id="{44B83135-4B8F-DD4B-A04C-E41F45709654}" type="datetimeFigureOut">
               <a:rPr lang="en-US" smtClean="0"/>
-              <a:t>1/23/18</a:t>
+              <a:t>1/24/2022</a:t>
             </a:fld>
             <a:endParaRPr lang="en-US"/>
           </a:p>
@@ -672,7 +672,7 @@
           <a:lstStyle/>
           <a:p>
             <a:r>
-              <a:rPr lang="en-US" smtClean="0"/>
+              <a:rPr lang="en-US"/>
               <a:t>Click to edit Master title style</a:t>
             </a:r>
             <a:endParaRPr lang="en-US" dirty="0"/>
@@ -696,35 +696,35 @@
           <a:p>
             <a:pPr lvl="0"/>
             <a:r>
-              <a:rPr lang="en-US" smtClean="0"/>
+              <a:rPr lang="en-US"/>
               <a:t>Click to edit Master text styles</a:t>
             </a:r>
           </a:p>
           <a:p>
             <a:pPr lvl="1"/>
             <a:r>
-              <a:rPr lang="en-US" smtClean="0"/>
+              <a:rPr lang="en-US"/>
               <a:t>Second level</a:t>
             </a:r>
           </a:p>
           <a:p>
             <a:pPr lvl="2"/>
             <a:r>
-              <a:rPr lang="en-US" smtClean="0"/>
+              <a:rPr lang="en-US"/>
               <a:t>Third level</a:t>
             </a:r>
           </a:p>
           <a:p>
             <a:pPr lvl="3"/>
             <a:r>
-              <a:rPr lang="en-US" smtClean="0"/>
+              <a:rPr lang="en-US"/>
               <a:t>Fourth level</a:t>
             </a:r>
           </a:p>
           <a:p>
             <a:pPr lvl="4"/>
             <a:r>
-              <a:rPr lang="en-US" smtClean="0"/>
+              <a:rPr lang="en-US"/>
               <a:t>Fifth level</a:t>
             </a:r>
             <a:endParaRPr lang="en-US" dirty="0"/>
@@ -748,7 +748,7 @@
           <a:p>
             <a:fld id="{44B83135-4B8F-DD4B-A04C-E41F45709654}" type="datetimeFigureOut">
               <a:rPr lang="en-US" smtClean="0"/>
-              <a:t>1/23/18</a:t>
+              <a:t>1/24/2022</a:t>
             </a:fld>
             <a:endParaRPr lang="en-US"/>
           </a:p>
@@ -846,7 +846,7 @@
           </a:lstStyle>
           <a:p>
             <a:r>
-              <a:rPr lang="en-US" smtClean="0"/>
+              <a:rPr lang="en-US"/>
               <a:t>Click to edit Master title style</a:t>
             </a:r>
             <a:endParaRPr lang="en-US" dirty="0"/>
@@ -966,7 +966,7 @@
           <a:p>
             <a:pPr lvl="0"/>
             <a:r>
-              <a:rPr lang="en-US" smtClean="0"/>
+              <a:rPr lang="en-US"/>
               <a:t>Click to edit Master text styles</a:t>
             </a:r>
           </a:p>
@@ -989,7 +989,7 @@
           <a:p>
             <a:fld id="{44B83135-4B8F-DD4B-A04C-E41F45709654}" type="datetimeFigureOut">
               <a:rPr lang="en-US" smtClean="0"/>
-              <a:t>1/23/18</a:t>
+              <a:t>1/24/2022</a:t>
             </a:fld>
             <a:endParaRPr lang="en-US"/>
           </a:p>
@@ -1078,7 +1078,7 @@
           <a:lstStyle/>
           <a:p>
             <a:r>
-              <a:rPr lang="en-US" smtClean="0"/>
+              <a:rPr lang="en-US"/>
               <a:t>Click to edit Master title style</a:t>
             </a:r>
             <a:endParaRPr lang="en-US" dirty="0"/>
@@ -1107,35 +1107,35 @@
           <a:p>
             <a:pPr lvl="0"/>
             <a:r>
-              <a:rPr lang="en-US" smtClean="0"/>
+              <a:rPr lang="en-US"/>
               <a:t>Click to edit Master text styles</a:t>
             </a:r>
           </a:p>
           <a:p>
             <a:pPr lvl="1"/>
             <a:r>
-              <a:rPr lang="en-US" smtClean="0"/>
+              <a:rPr lang="en-US"/>
               <a:t>Second level</a:t>
             </a:r>
           </a:p>
           <a:p>
             <a:pPr lvl="2"/>
             <a:r>
-              <a:rPr lang="en-US" smtClean="0"/>
+              <a:rPr lang="en-US"/>
               <a:t>Third level</a:t>
             </a:r>
           </a:p>
           <a:p>
             <a:pPr lvl="3"/>
             <a:r>
-              <a:rPr lang="en-US" smtClean="0"/>
+              <a:rPr lang="en-US"/>
               <a:t>Fourth level</a:t>
             </a:r>
           </a:p>
           <a:p>
             <a:pPr lvl="4"/>
             <a:r>
-              <a:rPr lang="en-US" smtClean="0"/>
+              <a:rPr lang="en-US"/>
               <a:t>Fifth level</a:t>
             </a:r>
             <a:endParaRPr lang="en-US" dirty="0"/>
@@ -1164,35 +1164,35 @@
           <a:p>
             <a:pPr lvl="0"/>
             <a:r>
-              <a:rPr lang="en-US" smtClean="0"/>
+              <a:rPr lang="en-US"/>
               <a:t>Click to edit Master text styles</a:t>
             </a:r>
           </a:p>
           <a:p>
             <a:pPr lvl="1"/>
             <a:r>
-              <a:rPr lang="en-US" smtClean="0"/>
+              <a:rPr lang="en-US"/>
               <a:t>Second level</a:t>
             </a:r>
           </a:p>
           <a:p>
             <a:pPr lvl="2"/>
             <a:r>
-              <a:rPr lang="en-US" smtClean="0"/>
+              <a:rPr lang="en-US"/>
               <a:t>Third level</a:t>
             </a:r>
           </a:p>
           <a:p>
             <a:pPr lvl="3"/>
             <a:r>
-              <a:rPr lang="en-US" smtClean="0"/>
+              <a:rPr lang="en-US"/>
               <a:t>Fourth level</a:t>
             </a:r>
           </a:p>
           <a:p>
             <a:pPr lvl="4"/>
             <a:r>
-              <a:rPr lang="en-US" smtClean="0"/>
+              <a:rPr lang="en-US"/>
               <a:t>Fifth level</a:t>
             </a:r>
             <a:endParaRPr lang="en-US" dirty="0"/>
@@ -1216,7 +1216,7 @@
           <a:p>
             <a:fld id="{44B83135-4B8F-DD4B-A04C-E41F45709654}" type="datetimeFigureOut">
               <a:rPr lang="en-US" smtClean="0"/>
-              <a:t>1/23/18</a:t>
+              <a:t>1/24/2022</a:t>
             </a:fld>
             <a:endParaRPr lang="en-US"/>
           </a:p>
@@ -1310,7 +1310,7 @@
           <a:lstStyle/>
           <a:p>
             <a:r>
-              <a:rPr lang="en-US" smtClean="0"/>
+              <a:rPr lang="en-US"/>
               <a:t>Click to edit Master title style</a:t>
             </a:r>
             <a:endParaRPr lang="en-US" dirty="0"/>
@@ -1376,7 +1376,7 @@
           <a:p>
             <a:pPr lvl="0"/>
             <a:r>
-              <a:rPr lang="en-US" smtClean="0"/>
+              <a:rPr lang="en-US"/>
               <a:t>Click to edit Master text styles</a:t>
             </a:r>
           </a:p>
@@ -1404,35 +1404,35 @@
           <a:p>
             <a:pPr lvl="0"/>
             <a:r>
-              <a:rPr lang="en-US" smtClean="0"/>
+              <a:rPr lang="en-US"/>
               <a:t>Click to edit Master text styles</a:t>
             </a:r>
           </a:p>
           <a:p>
             <a:pPr lvl="1"/>
             <a:r>
-              <a:rPr lang="en-US" smtClean="0"/>
+              <a:rPr lang="en-US"/>
               <a:t>Second level</a:t>
             </a:r>
           </a:p>
           <a:p>
             <a:pPr lvl="2"/>
             <a:r>
-              <a:rPr lang="en-US" smtClean="0"/>
+              <a:rPr lang="en-US"/>
               <a:t>Third level</a:t>
             </a:r>
           </a:p>
           <a:p>
             <a:pPr lvl="3"/>
             <a:r>
-              <a:rPr lang="en-US" smtClean="0"/>
+              <a:rPr lang="en-US"/>
               <a:t>Fourth level</a:t>
             </a:r>
           </a:p>
           <a:p>
             <a:pPr lvl="4"/>
             <a:r>
-              <a:rPr lang="en-US" smtClean="0"/>
+              <a:rPr lang="en-US"/>
               <a:t>Fifth level</a:t>
             </a:r>
             <a:endParaRPr lang="en-US" dirty="0"/>
@@ -1498,7 +1498,7 @@
           <a:p>
             <a:pPr lvl="0"/>
             <a:r>
-              <a:rPr lang="en-US" smtClean="0"/>
+              <a:rPr lang="en-US"/>
               <a:t>Click to edit Master text styles</a:t>
             </a:r>
           </a:p>
@@ -1526,35 +1526,35 @@
           <a:p>
             <a:pPr lvl="0"/>
             <a:r>
-              <a:rPr lang="en-US" smtClean="0"/>
+              <a:rPr lang="en-US"/>
               <a:t>Click to edit Master text styles</a:t>
             </a:r>
           </a:p>
           <a:p>
             <a:pPr lvl="1"/>
             <a:r>
-              <a:rPr lang="en-US" smtClean="0"/>
+              <a:rPr lang="en-US"/>
               <a:t>Second level</a:t>
             </a:r>
           </a:p>
           <a:p>
             <a:pPr lvl="2"/>
             <a:r>
-              <a:rPr lang="en-US" smtClean="0"/>
+              <a:rPr lang="en-US"/>
               <a:t>Third level</a:t>
             </a:r>
           </a:p>
           <a:p>
             <a:pPr lvl="3"/>
             <a:r>
-              <a:rPr lang="en-US" smtClean="0"/>
+              <a:rPr lang="en-US"/>
               <a:t>Fourth level</a:t>
             </a:r>
           </a:p>
           <a:p>
             <a:pPr lvl="4"/>
             <a:r>
-              <a:rPr lang="en-US" smtClean="0"/>
+              <a:rPr lang="en-US"/>
               <a:t>Fifth level</a:t>
             </a:r>
             <a:endParaRPr lang="en-US" dirty="0"/>
@@ -1578,7 +1578,7 @@
           <a:p>
             <a:fld id="{44B83135-4B8F-DD4B-A04C-E41F45709654}" type="datetimeFigureOut">
               <a:rPr lang="en-US" smtClean="0"/>
-              <a:t>1/23/18</a:t>
+              <a:t>1/24/2022</a:t>
             </a:fld>
             <a:endParaRPr lang="en-US"/>
           </a:p>
@@ -1667,7 +1667,7 @@
           <a:lstStyle/>
           <a:p>
             <a:r>
-              <a:rPr lang="en-US" smtClean="0"/>
+              <a:rPr lang="en-US"/>
               <a:t>Click to edit Master title style</a:t>
             </a:r>
             <a:endParaRPr lang="en-US" dirty="0"/>
@@ -1691,7 +1691,7 @@
           <a:p>
             <a:fld id="{44B83135-4B8F-DD4B-A04C-E41F45709654}" type="datetimeFigureOut">
               <a:rPr lang="en-US" smtClean="0"/>
-              <a:t>1/23/18</a:t>
+              <a:t>1/24/2022</a:t>
             </a:fld>
             <a:endParaRPr lang="en-US"/>
           </a:p>
@@ -1781,7 +1781,7 @@
           <a:p>
             <a:fld id="{44B83135-4B8F-DD4B-A04C-E41F45709654}" type="datetimeFigureOut">
               <a:rPr lang="en-US" smtClean="0"/>
-              <a:t>1/23/18</a:t>
+              <a:t>1/24/2022</a:t>
             </a:fld>
             <a:endParaRPr lang="en-US"/>
           </a:p>
@@ -1879,7 +1879,7 @@
           </a:lstStyle>
           <a:p>
             <a:r>
-              <a:rPr lang="en-US" smtClean="0"/>
+              <a:rPr lang="en-US"/>
               <a:t>Click to edit Master title style</a:t>
             </a:r>
             <a:endParaRPr lang="en-US" dirty="0"/>
@@ -1936,35 +1936,35 @@
           <a:p>
             <a:pPr lvl="0"/>
             <a:r>
-              <a:rPr lang="en-US" smtClean="0"/>
+              <a:rPr lang="en-US"/>
               <a:t>Click to edit Master text styles</a:t>
             </a:r>
           </a:p>
           <a:p>
             <a:pPr lvl="1"/>
             <a:r>
-              <a:rPr lang="en-US" smtClean="0"/>
+              <a:rPr lang="en-US"/>
               <a:t>Second level</a:t>
             </a:r>
           </a:p>
           <a:p>
             <a:pPr lvl="2"/>
             <a:r>
-              <a:rPr lang="en-US" smtClean="0"/>
+              <a:rPr lang="en-US"/>
               <a:t>Third level</a:t>
             </a:r>
           </a:p>
           <a:p>
             <a:pPr lvl="3"/>
             <a:r>
-              <a:rPr lang="en-US" smtClean="0"/>
+              <a:rPr lang="en-US"/>
               <a:t>Fourth level</a:t>
             </a:r>
           </a:p>
           <a:p>
             <a:pPr lvl="4"/>
             <a:r>
-              <a:rPr lang="en-US" smtClean="0"/>
+              <a:rPr lang="en-US"/>
               <a:t>Fifth level</a:t>
             </a:r>
             <a:endParaRPr lang="en-US" dirty="0"/>
@@ -2030,7 +2030,7 @@
           <a:p>
             <a:pPr lvl="0"/>
             <a:r>
-              <a:rPr lang="en-US" smtClean="0"/>
+              <a:rPr lang="en-US"/>
               <a:t>Click to edit Master text styles</a:t>
             </a:r>
           </a:p>
@@ -2053,7 +2053,7 @@
           <a:p>
             <a:fld id="{44B83135-4B8F-DD4B-A04C-E41F45709654}" type="datetimeFigureOut">
               <a:rPr lang="en-US" smtClean="0"/>
-              <a:t>1/23/18</a:t>
+              <a:t>1/24/2022</a:t>
             </a:fld>
             <a:endParaRPr lang="en-US"/>
           </a:p>
@@ -2151,7 +2151,7 @@
           </a:lstStyle>
           <a:p>
             <a:r>
-              <a:rPr lang="en-US" smtClean="0"/>
+              <a:rPr lang="en-US"/>
               <a:t>Click to edit Master title style</a:t>
             </a:r>
             <a:endParaRPr lang="en-US" dirty="0"/>
@@ -2216,7 +2216,7 @@
           </a:lstStyle>
           <a:p>
             <a:r>
-              <a:rPr lang="en-US" smtClean="0"/>
+              <a:rPr lang="en-US"/>
               <a:t>Drag picture to placeholder or click icon to add</a:t>
             </a:r>
             <a:endParaRPr lang="en-US" dirty="0"/>
@@ -2282,7 +2282,7 @@
           <a:p>
             <a:pPr lvl="0"/>
             <a:r>
-              <a:rPr lang="en-US" smtClean="0"/>
+              <a:rPr lang="en-US"/>
               <a:t>Click to edit Master text styles</a:t>
             </a:r>
           </a:p>
@@ -2305,7 +2305,7 @@
           <a:p>
             <a:fld id="{44B83135-4B8F-DD4B-A04C-E41F45709654}" type="datetimeFigureOut">
               <a:rPr lang="en-US" smtClean="0"/>
-              <a:t>1/23/18</a:t>
+              <a:t>1/24/2022</a:t>
             </a:fld>
             <a:endParaRPr lang="en-US"/>
           </a:p>
@@ -2409,7 +2409,7 @@
           <a:lstStyle/>
           <a:p>
             <a:r>
-              <a:rPr lang="en-US" smtClean="0"/>
+              <a:rPr lang="en-US"/>
               <a:t>Click to edit Master title style</a:t>
             </a:r>
             <a:endParaRPr lang="en-US" dirty="0"/>
@@ -2443,35 +2443,35 @@
           <a:p>
             <a:pPr lvl="0"/>
             <a:r>
-              <a:rPr lang="en-US" smtClean="0"/>
+              <a:rPr lang="en-US"/>
               <a:t>Click to edit Master text styles</a:t>
             </a:r>
           </a:p>
           <a:p>
             <a:pPr lvl="1"/>
             <a:r>
-              <a:rPr lang="en-US" smtClean="0"/>
+              <a:rPr lang="en-US"/>
               <a:t>Second level</a:t>
             </a:r>
           </a:p>
           <a:p>
             <a:pPr lvl="2"/>
             <a:r>
-              <a:rPr lang="en-US" smtClean="0"/>
+              <a:rPr lang="en-US"/>
               <a:t>Third level</a:t>
             </a:r>
           </a:p>
           <a:p>
             <a:pPr lvl="3"/>
             <a:r>
-              <a:rPr lang="en-US" smtClean="0"/>
+              <a:rPr lang="en-US"/>
               <a:t>Fourth level</a:t>
             </a:r>
           </a:p>
           <a:p>
             <a:pPr lvl="4"/>
             <a:r>
-              <a:rPr lang="en-US" smtClean="0"/>
+              <a:rPr lang="en-US"/>
               <a:t>Fifth level</a:t>
             </a:r>
             <a:endParaRPr lang="en-US" dirty="0"/>
@@ -2513,7 +2513,7 @@
           <a:p>
             <a:fld id="{44B83135-4B8F-DD4B-A04C-E41F45709654}" type="datetimeFigureOut">
               <a:rPr lang="en-US" smtClean="0"/>
-              <a:t>1/23/18</a:t>
+              <a:t>1/24/2022</a:t>
             </a:fld>
             <a:endParaRPr lang="en-US"/>
           </a:p>
@@ -3132,7 +3132,7 @@
           </a:lstStyle>
           <a:p>
             <a:r>
-              <a:rPr lang="en-US" sz="2200" b="1" dirty="0" smtClean="0">
+              <a:rPr lang="en-US" sz="2200" b="1" dirty="0">
                 <a:solidFill>
                   <a:schemeClr val="accent2">
                     <a:lumMod val="75000"/>
@@ -3150,7 +3150,7 @@
               <a:buFont typeface="Wingdings" panose="05000000000000000000" pitchFamily="2" charset="2"/>
               <a:buChar char="§"/>
             </a:pPr>
-            <a:endParaRPr lang="en-US" sz="1800" dirty="0" smtClean="0">
+            <a:endParaRPr lang="en-US" sz="1800" dirty="0">
               <a:latin typeface="Consolas" charset="0"/>
               <a:ea typeface="Consolas" charset="0"/>
               <a:cs typeface="Consolas" charset="0"/>
@@ -3162,7 +3162,7 @@
               <a:buChar char="§"/>
             </a:pPr>
             <a:r>
-              <a:rPr lang="en-US" sz="1700" dirty="0" smtClean="0">
+              <a:rPr lang="en-US" sz="1700" dirty="0">
                 <a:latin typeface="Consolas" charset="0"/>
                 <a:ea typeface="Consolas" charset="0"/>
                 <a:cs typeface="Consolas" charset="0"/>
@@ -3176,7 +3176,7 @@
               <a:buChar char="§"/>
             </a:pPr>
             <a:r>
-              <a:rPr lang="en-US" sz="1700" dirty="0" smtClean="0">
+              <a:rPr lang="en-US" sz="1700" dirty="0">
                 <a:latin typeface="Consolas" charset="0"/>
                 <a:ea typeface="Consolas" charset="0"/>
                 <a:cs typeface="Consolas" charset="0"/>
@@ -3189,7 +3189,7 @@
               <a:buFont typeface="Wingdings" panose="05000000000000000000" pitchFamily="2" charset="2"/>
               <a:buChar char="§"/>
             </a:pPr>
-            <a:endParaRPr lang="en-US" sz="1700" dirty="0" smtClean="0">
+            <a:endParaRPr lang="en-US" sz="1700" dirty="0">
               <a:latin typeface="Consolas" charset="0"/>
               <a:ea typeface="Consolas" charset="0"/>
               <a:cs typeface="Consolas" charset="0"/>
@@ -3198,7 +3198,7 @@
           <a:p>
             <a:pPr marL="146304" lvl="3" algn="l"/>
             <a:r>
-              <a:rPr lang="en-US" sz="1700" b="1" dirty="0" smtClean="0">
+              <a:rPr lang="en-US" sz="1700" b="1" dirty="0">
                 <a:solidFill>
                   <a:schemeClr val="accent5"/>
                 </a:solidFill>
@@ -3214,7 +3214,7 @@
               <a:buFont typeface="Wingdings" panose="05000000000000000000" pitchFamily="2" charset="2"/>
               <a:buChar char="§"/>
             </a:pPr>
-            <a:endParaRPr lang="en-US" sz="1700" dirty="0" smtClean="0">
+            <a:endParaRPr lang="en-US" sz="1700" dirty="0">
               <a:latin typeface="Consolas" charset="0"/>
               <a:ea typeface="Consolas" charset="0"/>
               <a:cs typeface="Consolas" charset="0"/>
@@ -3226,7 +3226,7 @@
               <a:buChar char="§"/>
             </a:pPr>
             <a:r>
-              <a:rPr lang="en-US" sz="1700" dirty="0" smtClean="0">
+              <a:rPr lang="en-US" sz="1700" dirty="0">
                 <a:latin typeface="Consolas" charset="0"/>
                 <a:ea typeface="Consolas" charset="0"/>
                 <a:cs typeface="Consolas" charset="0"/>
@@ -3239,7 +3239,7 @@
               <a:buFont typeface="Wingdings" panose="05000000000000000000" pitchFamily="2" charset="2"/>
               <a:buChar char="§"/>
             </a:pPr>
-            <a:endParaRPr lang="en-US" sz="1700" dirty="0" smtClean="0">
+            <a:endParaRPr lang="en-US" sz="1700" dirty="0">
               <a:latin typeface="Consolas" charset="0"/>
               <a:ea typeface="Consolas" charset="0"/>
               <a:cs typeface="Consolas" charset="0"/>
@@ -3248,7 +3248,7 @@
           <a:p>
             <a:pPr marL="146304" lvl="3" algn="l"/>
             <a:r>
-              <a:rPr lang="en-US" sz="1700" b="1" dirty="0" smtClean="0">
+              <a:rPr lang="en-US" sz="1700" b="1" dirty="0">
                 <a:solidFill>
                   <a:schemeClr val="accent5"/>
                 </a:solidFill>
@@ -3264,7 +3264,7 @@
               <a:buFont typeface="Wingdings" panose="05000000000000000000" pitchFamily="2" charset="2"/>
               <a:buChar char="§"/>
             </a:pPr>
-            <a:endParaRPr lang="en-US" sz="1700" dirty="0" smtClean="0">
+            <a:endParaRPr lang="en-US" sz="1700" dirty="0">
               <a:latin typeface="Consolas" charset="0"/>
               <a:ea typeface="Consolas" charset="0"/>
               <a:cs typeface="Consolas" charset="0"/>
@@ -3276,7 +3276,7 @@
               <a:buChar char="§"/>
             </a:pPr>
             <a:r>
-              <a:rPr lang="en-US" sz="1700" dirty="0" smtClean="0">
+              <a:rPr lang="en-US" sz="1700" dirty="0">
                 <a:latin typeface="Consolas" charset="0"/>
                 <a:ea typeface="Consolas" charset="0"/>
                 <a:cs typeface="Consolas" charset="0"/>
@@ -3290,7 +3290,7 @@
               <a:buChar char="§"/>
             </a:pPr>
             <a:r>
-              <a:rPr lang="en-US" sz="1700" dirty="0" smtClean="0">
+              <a:rPr lang="en-US" sz="1700" dirty="0">
                 <a:latin typeface="Consolas" charset="0"/>
                 <a:ea typeface="Consolas" charset="0"/>
                 <a:cs typeface="Consolas" charset="0"/>
@@ -3351,7 +3351,7 @@
             </p:style>
             <p:txBody>
               <a:bodyPr vert="horz" lIns="45720" tIns="45720" rIns="45720" bIns="45720" rtlCol="0">
-                <a:normAutofit fontScale="77500" lnSpcReduction="20000"/>
+                <a:normAutofit fontScale="85000" lnSpcReduction="20000"/>
               </a:bodyPr>
               <a:lstStyle>
                 <a:lvl1pPr marL="91440" indent="-91440" algn="l" defTabSz="914400" rtl="0" eaLnBrk="1" latinLnBrk="0" hangingPunct="1">
@@ -3577,7 +3577,7 @@
                   <a:buNone/>
                 </a:pPr>
                 <a:r>
-                  <a:rPr lang="en-US" sz="2400" b="1" dirty="0" smtClean="0">
+                  <a:rPr lang="en-US" sz="2400" b="1" dirty="0">
                     <a:solidFill>
                       <a:schemeClr val="accent5"/>
                     </a:solidFill>
@@ -3587,21 +3587,13 @@
                   </a:rPr>
                   <a:t>Variance</a:t>
                 </a:r>
-                <a:endParaRPr lang="en-US" sz="2400" b="1" dirty="0">
-                  <a:solidFill>
-                    <a:schemeClr val="accent5"/>
-                  </a:solidFill>
-                  <a:latin typeface="Consolas" charset="0"/>
-                  <a:ea typeface="Consolas" charset="0"/>
-                  <a:cs typeface="Consolas" charset="0"/>
-                </a:endParaRPr>
               </a:p>
               <a:p>
                 <a:pPr marL="502920" lvl="3" indent="-356616">
                   <a:buFont typeface="Wingdings" panose="05000000000000000000" pitchFamily="2" charset="2"/>
                   <a:buChar char="§"/>
                 </a:pPr>
-                <a:endParaRPr lang="en-US" sz="1800" dirty="0" smtClean="0">
+                <a:endParaRPr lang="en-US" sz="1800" dirty="0">
                   <a:latin typeface="Consolas" charset="0"/>
                   <a:ea typeface="Consolas" charset="0"/>
                   <a:cs typeface="Consolas" charset="0"/>
@@ -3613,28 +3605,12 @@
                   <a:buChar char="§"/>
                 </a:pPr>
                 <a:r>
-                  <a:rPr lang="en-US" sz="1800" dirty="0" smtClean="0">
+                  <a:rPr lang="en-US" sz="1800" dirty="0">
                     <a:latin typeface="Consolas" charset="0"/>
                     <a:ea typeface="Consolas" charset="0"/>
                     <a:cs typeface="Consolas" charset="0"/>
                   </a:rPr>
-                  <a:t>DEVIANT: how far from the </a:t>
-                </a:r>
-                <a:r>
-                  <a:rPr lang="en-US" sz="1800" dirty="0" smtClean="0">
-                    <a:latin typeface="Consolas" charset="0"/>
-                    <a:ea typeface="Consolas" charset="0"/>
-                    <a:cs typeface="Consolas" charset="0"/>
-                  </a:rPr>
-                  <a:t>center (mean</a:t>
-                </a:r>
-                <a:r>
-                  <a:rPr lang="en-US" sz="1800" dirty="0" smtClean="0">
-                    <a:latin typeface="Consolas" charset="0"/>
-                    <a:ea typeface="Consolas" charset="0"/>
-                    <a:cs typeface="Consolas" charset="0"/>
-                  </a:rPr>
-                  <a:t>)</a:t>
+                  <a:t>DEVIANT: how far from the center (mean)</a:t>
                 </a:r>
               </a:p>
               <a:p>
@@ -3643,28 +3619,12 @@
                   <a:buChar char="§"/>
                 </a:pPr>
                 <a:r>
-                  <a:rPr lang="en-US" sz="1800" dirty="0" smtClean="0">
-                    <a:latin typeface="Consolas" charset="0"/>
-                    <a:ea typeface="Consolas" charset="0"/>
-                    <a:cs typeface="Consolas" charset="0"/>
-                  </a:rPr>
-                  <a:t>SQUARE:  so + &amp; - don’t cancel out to 0</a:t>
-                </a:r>
-                <a:r>
                   <a:rPr lang="en-US" sz="1800" dirty="0">
                     <a:latin typeface="Consolas" charset="0"/>
                     <a:ea typeface="Consolas" charset="0"/>
                     <a:cs typeface="Consolas" charset="0"/>
                   </a:rPr>
-                  <a:t> </a:t>
-                </a:r>
-                <a:r>
-                  <a:rPr lang="en-US" sz="1800" dirty="0" smtClean="0">
-                    <a:latin typeface="Consolas" charset="0"/>
-                    <a:ea typeface="Consolas" charset="0"/>
-                    <a:cs typeface="Consolas" charset="0"/>
-                  </a:rPr>
-                  <a:t>(units are also squared)</a:t>
+                  <a:t>SQUARE:  so + &amp; - don’t cancel out to 0 (units are also squared)</a:t>
                 </a:r>
               </a:p>
               <a:p>
@@ -3673,7 +3633,7 @@
                   <a:buChar char="§"/>
                 </a:pPr>
                 <a:r>
-                  <a:rPr lang="en-US" sz="1800" dirty="0" smtClean="0">
+                  <a:rPr lang="en-US" sz="1800" dirty="0">
                     <a:latin typeface="Consolas" charset="0"/>
                     <a:ea typeface="Consolas" charset="0"/>
                     <a:cs typeface="Consolas" charset="0"/>
@@ -3687,7 +3647,7 @@
                   <a:buChar char="§"/>
                 </a:pPr>
                 <a:r>
-                  <a:rPr lang="en-US" sz="1800" dirty="0" smtClean="0">
+                  <a:rPr lang="en-US" sz="1800" dirty="0">
                     <a:latin typeface="Consolas" charset="0"/>
                     <a:ea typeface="Consolas" charset="0"/>
                     <a:cs typeface="Consolas" charset="0"/>
@@ -3744,7 +3704,7 @@
                               <a:solidFill>
                                 <a:schemeClr val="accent5"/>
                               </a:solidFill>
-                              <a:latin typeface="Cambria Math" charset="0"/>
+                              <a:latin typeface="Cambria Math" panose="02040503050406030204" pitchFamily="18" charset="0"/>
                             </a:rPr>
                           </m:ctrlPr>
                         </m:naryPr>
@@ -3758,7 +3718,7 @@
                                   <a:solidFill>
                                     <a:schemeClr val="accent5"/>
                                   </a:solidFill>
-                                  <a:latin typeface="Cambria Math" charset="0"/>
+                                  <a:latin typeface="Cambria Math" panose="02040503050406030204" pitchFamily="18" charset="0"/>
                                 </a:rPr>
                               </m:ctrlPr>
                             </m:sSupPr>
@@ -3770,7 +3730,7 @@
                                       <a:solidFill>
                                         <a:schemeClr val="accent5"/>
                                       </a:solidFill>
-                                      <a:latin typeface="Cambria Math" charset="0"/>
+                                      <a:latin typeface="Cambria Math" panose="02040503050406030204" pitchFamily="18" charset="0"/>
                                     </a:rPr>
                                   </m:ctrlPr>
                                 </m:dPr>
@@ -3782,7 +3742,7 @@
                                           <a:solidFill>
                                             <a:schemeClr val="accent5"/>
                                           </a:solidFill>
-                                          <a:latin typeface="Cambria Math" charset="0"/>
+                                          <a:latin typeface="Cambria Math" panose="02040503050406030204" pitchFamily="18" charset="0"/>
                                         </a:rPr>
                                       </m:ctrlPr>
                                     </m:sSubPr>
@@ -3847,7 +3807,7 @@
                     </m:oMath>
                   </m:oMathPara>
                 </a14:m>
-                <a:endParaRPr lang="en-US" sz="1800" dirty="0" smtClean="0">
+                <a:endParaRPr lang="en-US" sz="1800" dirty="0">
                   <a:solidFill>
                     <a:schemeClr val="accent5"/>
                   </a:solidFill>
@@ -3891,7 +3851,7 @@
                               <a:solidFill>
                                 <a:schemeClr val="accent5"/>
                               </a:solidFill>
-                              <a:latin typeface="Cambria Math" charset="0"/>
+                              <a:latin typeface="Cambria Math" panose="02040503050406030204" pitchFamily="18" charset="0"/>
                             </a:rPr>
                           </m:ctrlPr>
                         </m:fPr>
@@ -3921,7 +3881,7 @@
                     </m:oMath>
                   </m:oMathPara>
                 </a14:m>
-                <a:endParaRPr lang="en-US" sz="1800" dirty="0" smtClean="0">
+                <a:endParaRPr lang="en-US" sz="1800" dirty="0">
                   <a:latin typeface="Consolas" charset="0"/>
                   <a:ea typeface="Consolas" charset="0"/>
                   <a:cs typeface="Consolas" charset="0"/>
@@ -3931,7 +3891,7 @@
                 <a:pPr marL="146304" lvl="3" indent="0" algn="ctr">
                   <a:buNone/>
                 </a:pPr>
-                <a:endParaRPr lang="en-US" sz="1800" dirty="0" smtClean="0">
+                <a:endParaRPr lang="en-US" sz="1800" dirty="0">
                   <a:latin typeface="Consolas" charset="0"/>
                   <a:ea typeface="Consolas" charset="0"/>
                   <a:cs typeface="Consolas" charset="0"/>
@@ -3954,7 +3914,7 @@
                               <a:solidFill>
                                 <a:schemeClr val="accent5"/>
                               </a:solidFill>
-                              <a:latin typeface="Cambria Math" charset="0"/>
+                              <a:latin typeface="Cambria Math" panose="02040503050406030204" pitchFamily="18" charset="0"/>
                               <a:ea typeface="Consolas" charset="0"/>
                               <a:cs typeface="Consolas" charset="0"/>
                             </a:rPr>
@@ -4005,7 +3965,7 @@
                               <a:solidFill>
                                 <a:schemeClr val="accent5"/>
                               </a:solidFill>
-                              <a:latin typeface="Cambria Math" charset="0"/>
+                              <a:latin typeface="Cambria Math" panose="02040503050406030204" pitchFamily="18" charset="0"/>
                               <a:ea typeface="Consolas" charset="0"/>
                               <a:cs typeface="Consolas" charset="0"/>
                             </a:rPr>
@@ -4022,7 +3982,7 @@
                                   <a:solidFill>
                                     <a:schemeClr val="accent5"/>
                                   </a:solidFill>
-                                  <a:latin typeface="Cambria Math" charset="0"/>
+                                  <a:latin typeface="Cambria Math" panose="02040503050406030204" pitchFamily="18" charset="0"/>
                                   <a:ea typeface="Consolas" charset="0"/>
                                   <a:cs typeface="Consolas" charset="0"/>
                                 </a:rPr>
@@ -4031,34 +3991,72 @@
                             <m:sub/>
                             <m:sup/>
                             <m:e>
-                              <m:d>
-                                <m:dPr>
+                              <m:sSup>
+                                <m:sSupPr>
                                   <m:ctrlPr>
-                                    <a:rPr lang="en-US" sz="1800" i="1">
+                                    <a:rPr lang="en-US" sz="1800" i="1" smtClean="0">
                                       <a:solidFill>
                                         <a:schemeClr val="accent5"/>
                                       </a:solidFill>
-                                      <a:latin typeface="Cambria Math" charset="0"/>
-                                      <a:ea typeface="Consolas" charset="0"/>
-                                      <a:cs typeface="Consolas" charset="0"/>
+                                      <a:latin typeface="Cambria Math" panose="02040503050406030204" pitchFamily="18" charset="0"/>
                                     </a:rPr>
                                   </m:ctrlPr>
-                                </m:dPr>
+                                </m:sSupPr>
                                 <m:e>
-                                  <m:sSub>
-                                    <m:sSubPr>
+                                  <m:d>
+                                    <m:dPr>
                                       <m:ctrlPr>
                                         <a:rPr lang="en-US" sz="1800" i="1">
                                           <a:solidFill>
                                             <a:schemeClr val="accent5"/>
                                           </a:solidFill>
-                                          <a:latin typeface="Cambria Math" charset="0"/>
+                                          <a:latin typeface="Cambria Math" panose="02040503050406030204" pitchFamily="18" charset="0"/>
                                           <a:ea typeface="Consolas" charset="0"/>
                                           <a:cs typeface="Consolas" charset="0"/>
                                         </a:rPr>
                                       </m:ctrlPr>
-                                    </m:sSubPr>
+                                    </m:dPr>
                                     <m:e>
+                                      <m:sSub>
+                                        <m:sSubPr>
+                                          <m:ctrlPr>
+                                            <a:rPr lang="en-US" sz="1800" i="1">
+                                              <a:solidFill>
+                                                <a:schemeClr val="accent5"/>
+                                              </a:solidFill>
+                                              <a:latin typeface="Cambria Math" panose="02040503050406030204" pitchFamily="18" charset="0"/>
+                                              <a:ea typeface="Consolas" charset="0"/>
+                                              <a:cs typeface="Consolas" charset="0"/>
+                                            </a:rPr>
+                                          </m:ctrlPr>
+                                        </m:sSubPr>
+                                        <m:e>
+                                          <m:r>
+                                            <a:rPr lang="en-US" sz="1800" i="1">
+                                              <a:solidFill>
+                                                <a:schemeClr val="accent5"/>
+                                              </a:solidFill>
+                                              <a:latin typeface="Cambria Math" charset="0"/>
+                                              <a:ea typeface="Consolas" charset="0"/>
+                                              <a:cs typeface="Consolas" charset="0"/>
+                                            </a:rPr>
+                                            <m:t>𝑋</m:t>
+                                          </m:r>
+                                        </m:e>
+                                        <m:sub>
+                                          <m:r>
+                                            <a:rPr lang="en-US" sz="1800" i="1">
+                                              <a:solidFill>
+                                                <a:schemeClr val="accent5"/>
+                                              </a:solidFill>
+                                              <a:latin typeface="Cambria Math" charset="0"/>
+                                              <a:ea typeface="Consolas" charset="0"/>
+                                              <a:cs typeface="Consolas" charset="0"/>
+                                            </a:rPr>
+                                            <m:t>𝑖</m:t>
+                                          </m:r>
+                                        </m:sub>
+                                      </m:sSub>
                                       <m:r>
                                         <a:rPr lang="en-US" sz="1800" i="1">
                                           <a:solidFill>
@@ -4068,10 +4066,8 @@
                                           <a:ea typeface="Consolas" charset="0"/>
                                           <a:cs typeface="Consolas" charset="0"/>
                                         </a:rPr>
-                                        <m:t>𝑋</m:t>
+                                        <m:t>− </m:t>
                                       </m:r>
-                                    </m:e>
-                                    <m:sub>
                                       <m:r>
                                         <a:rPr lang="en-US" sz="1800" i="1">
                                           <a:solidFill>
@@ -4081,34 +4077,23 @@
                                           <a:ea typeface="Consolas" charset="0"/>
                                           <a:cs typeface="Consolas" charset="0"/>
                                         </a:rPr>
-                                        <m:t>𝑖</m:t>
+                                        <m:t>𝜇</m:t>
                                       </m:r>
-                                    </m:sub>
-                                  </m:sSub>
+                                    </m:e>
+                                  </m:d>
+                                </m:e>
+                                <m:sup>
                                   <m:r>
-                                    <a:rPr lang="en-US" sz="1800" i="1">
+                                    <a:rPr lang="en-US" sz="1800" b="0" i="1" smtClean="0">
                                       <a:solidFill>
                                         <a:schemeClr val="accent5"/>
                                       </a:solidFill>
-                                      <a:latin typeface="Cambria Math" charset="0"/>
-                                      <a:ea typeface="Consolas" charset="0"/>
-                                      <a:cs typeface="Consolas" charset="0"/>
+                                      <a:latin typeface="Cambria Math" panose="02040503050406030204" pitchFamily="18" charset="0"/>
                                     </a:rPr>
-                                    <m:t>− </m:t>
+                                    <m:t>2</m:t>
                                   </m:r>
-                                  <m:r>
-                                    <a:rPr lang="en-US" sz="1800" i="1">
-                                      <a:solidFill>
-                                        <a:schemeClr val="accent5"/>
-                                      </a:solidFill>
-                                      <a:latin typeface="Cambria Math" charset="0"/>
-                                      <a:ea typeface="Consolas" charset="0"/>
-                                      <a:cs typeface="Consolas" charset="0"/>
-                                    </a:rPr>
-                                    <m:t>𝜇</m:t>
-                                  </m:r>
-                                </m:e>
-                              </m:d>
+                                </m:sup>
+                              </m:sSup>
                             </m:e>
                           </m:nary>
                         </m:num>
@@ -4144,7 +4129,7 @@
                               <a:solidFill>
                                 <a:schemeClr val="accent5"/>
                               </a:solidFill>
-                              <a:latin typeface="Cambria Math" charset="0"/>
+                              <a:latin typeface="Cambria Math" panose="02040503050406030204" pitchFamily="18" charset="0"/>
                               <a:ea typeface="Consolas" charset="0"/>
                               <a:cs typeface="Consolas" charset="0"/>
                             </a:rPr>
@@ -4216,7 +4201,7 @@
                   <a:buFont typeface="Wingdings" panose="05000000000000000000" pitchFamily="2" charset="2"/>
                   <a:buChar char="§"/>
                 </a:pPr>
-                <a:endParaRPr lang="en-US" sz="1800" dirty="0" smtClean="0">
+                <a:endParaRPr lang="en-US" sz="1800" dirty="0">
                   <a:latin typeface="Consolas" charset="0"/>
                   <a:ea typeface="Consolas" charset="0"/>
                   <a:cs typeface="Consolas" charset="0"/>
@@ -4228,7 +4213,7 @@
                   <a:buChar char="§"/>
                 </a:pPr>
                 <a:r>
-                  <a:rPr lang="en-US" sz="1800" dirty="0" smtClean="0">
+                  <a:rPr lang="en-US" sz="1800" dirty="0">
                     <a:latin typeface="Consolas" charset="0"/>
                     <a:ea typeface="Consolas" charset="0"/>
                     <a:cs typeface="Consolas" charset="0"/>
@@ -4241,7 +4226,7 @@
                   <a:buFont typeface="Wingdings" panose="05000000000000000000" pitchFamily="2" charset="2"/>
                   <a:buChar char="§"/>
                 </a:pPr>
-                <a:endParaRPr lang="en-US" sz="1800" dirty="0" smtClean="0">
+                <a:endParaRPr lang="en-US" sz="1800" dirty="0">
                   <a:latin typeface="Consolas" charset="0"/>
                   <a:ea typeface="Consolas" charset="0"/>
                   <a:cs typeface="Consolas" charset="0"/>
@@ -4264,7 +4249,7 @@
                               <a:solidFill>
                                 <a:schemeClr val="accent5"/>
                               </a:solidFill>
-                              <a:latin typeface="Cambria Math" charset="0"/>
+                              <a:latin typeface="Cambria Math" panose="02040503050406030204" pitchFamily="18" charset="0"/>
                               <a:ea typeface="Consolas" charset="0"/>
                               <a:cs typeface="Consolas" charset="0"/>
                             </a:rPr>
@@ -4315,7 +4300,7 @@
                               <a:solidFill>
                                 <a:schemeClr val="accent5"/>
                               </a:solidFill>
-                              <a:latin typeface="Cambria Math" charset="0"/>
+                              <a:latin typeface="Cambria Math" panose="02040503050406030204" pitchFamily="18" charset="0"/>
                               <a:ea typeface="Consolas" charset="0"/>
                               <a:cs typeface="Consolas" charset="0"/>
                             </a:rPr>
@@ -4332,7 +4317,7 @@
                                   <a:solidFill>
                                     <a:schemeClr val="accent5"/>
                                   </a:solidFill>
-                                  <a:latin typeface="Cambria Math" charset="0"/>
+                                  <a:latin typeface="Cambria Math" panose="02040503050406030204" pitchFamily="18" charset="0"/>
                                   <a:ea typeface="Consolas" charset="0"/>
                                   <a:cs typeface="Consolas" charset="0"/>
                                 </a:rPr>
@@ -4341,34 +4326,72 @@
                             <m:sub/>
                             <m:sup/>
                             <m:e>
-                              <m:d>
-                                <m:dPr>
+                              <m:sSup>
+                                <m:sSupPr>
                                   <m:ctrlPr>
-                                    <a:rPr lang="en-US" sz="1800" i="1">
+                                    <a:rPr lang="en-US" sz="1800" i="1" smtClean="0">
                                       <a:solidFill>
                                         <a:schemeClr val="accent5"/>
                                       </a:solidFill>
-                                      <a:latin typeface="Cambria Math" charset="0"/>
-                                      <a:ea typeface="Consolas" charset="0"/>
-                                      <a:cs typeface="Consolas" charset="0"/>
+                                      <a:latin typeface="Cambria Math" panose="02040503050406030204" pitchFamily="18" charset="0"/>
                                     </a:rPr>
                                   </m:ctrlPr>
-                                </m:dPr>
+                                </m:sSupPr>
                                 <m:e>
-                                  <m:sSub>
-                                    <m:sSubPr>
+                                  <m:d>
+                                    <m:dPr>
                                       <m:ctrlPr>
                                         <a:rPr lang="en-US" sz="1800" i="1">
                                           <a:solidFill>
                                             <a:schemeClr val="accent5"/>
                                           </a:solidFill>
-                                          <a:latin typeface="Cambria Math" charset="0"/>
+                                          <a:latin typeface="Cambria Math" panose="02040503050406030204" pitchFamily="18" charset="0"/>
                                           <a:ea typeface="Consolas" charset="0"/>
                                           <a:cs typeface="Consolas" charset="0"/>
                                         </a:rPr>
                                       </m:ctrlPr>
-                                    </m:sSubPr>
+                                    </m:dPr>
                                     <m:e>
+                                      <m:sSub>
+                                        <m:sSubPr>
+                                          <m:ctrlPr>
+                                            <a:rPr lang="en-US" sz="1800" i="1">
+                                              <a:solidFill>
+                                                <a:schemeClr val="accent5"/>
+                                              </a:solidFill>
+                                              <a:latin typeface="Cambria Math" panose="02040503050406030204" pitchFamily="18" charset="0"/>
+                                              <a:ea typeface="Consolas" charset="0"/>
+                                              <a:cs typeface="Consolas" charset="0"/>
+                                            </a:rPr>
+                                          </m:ctrlPr>
+                                        </m:sSubPr>
+                                        <m:e>
+                                          <m:r>
+                                            <a:rPr lang="en-US" sz="1800" i="1">
+                                              <a:solidFill>
+                                                <a:schemeClr val="accent5"/>
+                                              </a:solidFill>
+                                              <a:latin typeface="Cambria Math" charset="0"/>
+                                              <a:ea typeface="Consolas" charset="0"/>
+                                              <a:cs typeface="Consolas" charset="0"/>
+                                            </a:rPr>
+                                            <m:t>𝑋</m:t>
+                                          </m:r>
+                                        </m:e>
+                                        <m:sub>
+                                          <m:r>
+                                            <a:rPr lang="en-US" sz="1800" i="1">
+                                              <a:solidFill>
+                                                <a:schemeClr val="accent5"/>
+                                              </a:solidFill>
+                                              <a:latin typeface="Cambria Math" charset="0"/>
+                                              <a:ea typeface="Consolas" charset="0"/>
+                                              <a:cs typeface="Consolas" charset="0"/>
+                                            </a:rPr>
+                                            <m:t>𝑖</m:t>
+                                          </m:r>
+                                        </m:sub>
+                                      </m:sSub>
                                       <m:r>
                                         <a:rPr lang="en-US" sz="1800" i="1">
                                           <a:solidFill>
@@ -4378,64 +4401,51 @@
                                           <a:ea typeface="Consolas" charset="0"/>
                                           <a:cs typeface="Consolas" charset="0"/>
                                         </a:rPr>
-                                        <m:t>𝑋</m:t>
+                                        <m:t>− </m:t>
                                       </m:r>
+                                      <m:acc>
+                                        <m:accPr>
+                                          <m:chr m:val="̅"/>
+                                          <m:ctrlPr>
+                                            <a:rPr lang="en-US" sz="1800" i="1">
+                                              <a:solidFill>
+                                                <a:schemeClr val="accent5"/>
+                                              </a:solidFill>
+                                              <a:latin typeface="Cambria Math" panose="02040503050406030204" pitchFamily="18" charset="0"/>
+                                              <a:ea typeface="Consolas" charset="0"/>
+                                              <a:cs typeface="Consolas" charset="0"/>
+                                            </a:rPr>
+                                          </m:ctrlPr>
+                                        </m:accPr>
+                                        <m:e>
+                                          <m:r>
+                                            <a:rPr lang="en-US" sz="1800" i="1">
+                                              <a:solidFill>
+                                                <a:schemeClr val="accent5"/>
+                                              </a:solidFill>
+                                              <a:latin typeface="Cambria Math" charset="0"/>
+                                              <a:ea typeface="Consolas" charset="0"/>
+                                              <a:cs typeface="Consolas" charset="0"/>
+                                            </a:rPr>
+                                            <m:t>𝑋</m:t>
+                                          </m:r>
+                                        </m:e>
+                                      </m:acc>
                                     </m:e>
-                                    <m:sub>
-                                      <m:r>
-                                        <a:rPr lang="en-US" sz="1800" i="1">
-                                          <a:solidFill>
-                                            <a:schemeClr val="accent5"/>
-                                          </a:solidFill>
-                                          <a:latin typeface="Cambria Math" charset="0"/>
-                                          <a:ea typeface="Consolas" charset="0"/>
-                                          <a:cs typeface="Consolas" charset="0"/>
-                                        </a:rPr>
-                                        <m:t>𝑖</m:t>
-                                      </m:r>
-                                    </m:sub>
-                                  </m:sSub>
+                                  </m:d>
+                                </m:e>
+                                <m:sup>
                                   <m:r>
-                                    <a:rPr lang="en-US" sz="1800" i="1">
+                                    <a:rPr lang="en-US" sz="1800" b="0" i="1" smtClean="0">
                                       <a:solidFill>
                                         <a:schemeClr val="accent5"/>
                                       </a:solidFill>
-                                      <a:latin typeface="Cambria Math" charset="0"/>
-                                      <a:ea typeface="Consolas" charset="0"/>
-                                      <a:cs typeface="Consolas" charset="0"/>
+                                      <a:latin typeface="Cambria Math" panose="02040503050406030204" pitchFamily="18" charset="0"/>
                                     </a:rPr>
-                                    <m:t>− </m:t>
+                                    <m:t>2</m:t>
                                   </m:r>
-                                  <m:acc>
-                                    <m:accPr>
-                                      <m:chr m:val="̅"/>
-                                      <m:ctrlPr>
-                                        <a:rPr lang="en-US" sz="1800" i="1" smtClean="0">
-                                          <a:solidFill>
-                                            <a:schemeClr val="accent5"/>
-                                          </a:solidFill>
-                                          <a:latin typeface="Cambria Math" charset="0"/>
-                                          <a:ea typeface="Consolas" charset="0"/>
-                                          <a:cs typeface="Consolas" charset="0"/>
-                                        </a:rPr>
-                                      </m:ctrlPr>
-                                    </m:accPr>
-                                    <m:e>
-                                      <m:r>
-                                        <a:rPr lang="en-US" sz="1800" b="0" i="1" smtClean="0">
-                                          <a:solidFill>
-                                            <a:schemeClr val="accent5"/>
-                                          </a:solidFill>
-                                          <a:latin typeface="Cambria Math" charset="0"/>
-                                          <a:ea typeface="Consolas" charset="0"/>
-                                          <a:cs typeface="Consolas" charset="0"/>
-                                        </a:rPr>
-                                        <m:t>𝑋</m:t>
-                                      </m:r>
-                                    </m:e>
-                                  </m:acc>
-                                </m:e>
-                              </m:d>
+                                </m:sup>
+                              </m:sSup>
                             </m:e>
                           </m:nary>
                         </m:num>
@@ -4482,7 +4492,7 @@
                               <a:solidFill>
                                 <a:schemeClr val="accent5"/>
                               </a:solidFill>
-                              <a:latin typeface="Cambria Math" charset="0"/>
+                              <a:latin typeface="Cambria Math" panose="02040503050406030204" pitchFamily="18" charset="0"/>
                               <a:ea typeface="Consolas" charset="0"/>
                               <a:cs typeface="Consolas" charset="0"/>
                             </a:rPr>
@@ -4544,7 +4554,7 @@
                               <a:solidFill>
                                 <a:schemeClr val="accent5"/>
                               </a:solidFill>
-                              <a:latin typeface="Cambria Math" charset="0"/>
+                              <a:latin typeface="Cambria Math" panose="02040503050406030204" pitchFamily="18" charset="0"/>
                               <a:ea typeface="Consolas" charset="0"/>
                               <a:cs typeface="Consolas" charset="0"/>
                             </a:rPr>
@@ -4624,7 +4634,7 @@
               <a:p>
                 <a:pPr marL="432054" lvl="3" indent="-285750"/>
                 <a:r>
-                  <a:rPr lang="en-US" sz="1800" i="1" dirty="0" smtClean="0">
+                  <a:rPr lang="en-US" sz="1800" i="1" dirty="0">
                     <a:latin typeface="Consolas" charset="0"/>
                     <a:ea typeface="Consolas" charset="0"/>
                     <a:cs typeface="Consolas" charset="0"/>
@@ -4632,7 +4642,7 @@
                   <a:t>Degrees of Freedom: </a:t>
                 </a:r>
                 <a:r>
-                  <a:rPr lang="en-US" sz="1800" i="1" dirty="0" err="1" smtClean="0">
+                  <a:rPr lang="en-US" sz="1800" i="1" dirty="0" err="1">
                     <a:solidFill>
                       <a:schemeClr val="accent5"/>
                     </a:solidFill>
@@ -4643,7 +4653,7 @@
                   <a:t>df</a:t>
                 </a:r>
                 <a:r>
-                  <a:rPr lang="en-US" sz="1800" i="1" dirty="0" smtClean="0">
+                  <a:rPr lang="en-US" sz="1800" i="1" dirty="0">
                     <a:solidFill>
                       <a:schemeClr val="accent5"/>
                     </a:solidFill>
@@ -4653,14 +4663,6 @@
                   </a:rPr>
                   <a:t> = n - 1</a:t>
                 </a:r>
-                <a:endParaRPr lang="en-US" sz="1800" i="1" dirty="0">
-                  <a:solidFill>
-                    <a:schemeClr val="accent5"/>
-                  </a:solidFill>
-                  <a:latin typeface="Consolas" charset="0"/>
-                  <a:ea typeface="Consolas" charset="0"/>
-                  <a:cs typeface="Consolas" charset="0"/>
-                </a:endParaRPr>
               </a:p>
             </p:txBody>
           </p:sp>
@@ -4682,10 +4684,10 @@
               <a:prstGeom prst="rect">
                 <a:avLst/>
               </a:prstGeom>
-              <a:blipFill rotWithShape="0">
+              <a:blipFill>
                 <a:blip r:embed="rId2"/>
                 <a:stretch>
-                  <a:fillRect t="-1501"/>
+                  <a:fillRect t="-1848" b="-808"/>
                 </a:stretch>
               </a:blipFill>
               <a:ln w="38100">
@@ -4709,8 +4711,8 @@
           </p:sp>
         </mc:Fallback>
       </mc:AlternateContent>
-      <mc:AlternateContent xmlns:mc="http://schemas.openxmlformats.org/markup-compatibility/2006">
-        <mc:Choice xmlns:a14="http://schemas.microsoft.com/office/drawing/2010/main" Requires="a14">
+      <mc:AlternateContent xmlns:mc="http://schemas.openxmlformats.org/markup-compatibility/2006" xmlns:a14="http://schemas.microsoft.com/office/drawing/2010/main">
+        <mc:Choice Requires="a14">
           <p:sp>
             <p:nvSpPr>
               <p:cNvPr id="6" name="Content Placeholder 2"/>
@@ -4977,7 +4979,7 @@
                   <a:buNone/>
                 </a:pPr>
                 <a:r>
-                  <a:rPr lang="en-US" sz="2000" b="1" dirty="0" smtClean="0">
+                  <a:rPr lang="en-US" sz="2000" b="1" dirty="0">
                     <a:solidFill>
                       <a:schemeClr val="accent6">
                         <a:lumMod val="75000"/>
@@ -4989,41 +4991,12 @@
                   </a:rPr>
                   <a:t>Standard Deviation</a:t>
                 </a:r>
-                <a:endParaRPr lang="en-US" sz="2000" b="1" dirty="0">
-                  <a:solidFill>
-                    <a:schemeClr val="accent6">
-                      <a:lumMod val="75000"/>
-                    </a:schemeClr>
-                  </a:solidFill>
-                  <a:latin typeface="Consolas" charset="0"/>
-                  <a:ea typeface="Consolas" charset="0"/>
-                  <a:cs typeface="Consolas" charset="0"/>
-                </a:endParaRPr>
               </a:p>
               <a:p>
                 <a:pPr marL="502920" lvl="3" indent="-356616">
                   <a:buFont typeface="Wingdings" panose="05000000000000000000" pitchFamily="2" charset="2"/>
                   <a:buChar char="§"/>
                 </a:pPr>
-                <a:endParaRPr lang="en-US" sz="1600" dirty="0" smtClean="0">
-                  <a:latin typeface="Consolas" charset="0"/>
-                  <a:ea typeface="Consolas" charset="0"/>
-                  <a:cs typeface="Consolas" charset="0"/>
-                </a:endParaRPr>
-              </a:p>
-              <a:p>
-                <a:pPr marL="502920" lvl="3" indent="-356616">
-                  <a:buFont typeface="Wingdings" panose="05000000000000000000" pitchFamily="2" charset="2"/>
-                  <a:buChar char="§"/>
-                </a:pPr>
-                <a:r>
-                  <a:rPr lang="en-US" sz="1600" dirty="0" smtClean="0">
-                    <a:latin typeface="Consolas" charset="0"/>
-                    <a:ea typeface="Consolas" charset="0"/>
-                    <a:cs typeface="Consolas" charset="0"/>
-                  </a:rPr>
-                  <a:t>SQUARE-ROOT VARIANCE to get back to the original units</a:t>
-                </a:r>
                 <a:endParaRPr lang="en-US" sz="1600" dirty="0">
                   <a:latin typeface="Consolas" charset="0"/>
                   <a:ea typeface="Consolas" charset="0"/>
@@ -5041,15 +5014,21 @@
                     <a:ea typeface="Consolas" charset="0"/>
                     <a:cs typeface="Consolas" charset="0"/>
                   </a:rPr>
-                  <a:t>In a POPULATION: called “</a:t>
+                  <a:t>SQUARE-ROOT VARIANCE to get back to the original units</a:t>
                 </a:r>
+              </a:p>
+              <a:p>
+                <a:pPr marL="502920" lvl="3" indent="-356616">
+                  <a:buFont typeface="Wingdings" panose="05000000000000000000" pitchFamily="2" charset="2"/>
+                  <a:buChar char="§"/>
+                </a:pPr>
                 <a:r>
-                  <a:rPr lang="en-US" sz="1600" dirty="0" smtClean="0">
+                  <a:rPr lang="en-US" sz="1600" dirty="0">
                     <a:latin typeface="Consolas" charset="0"/>
                     <a:ea typeface="Consolas" charset="0"/>
                     <a:cs typeface="Consolas" charset="0"/>
                   </a:rPr>
-                  <a:t>sigma”</a:t>
+                  <a:t>In a POPULATION: called “sigma”</a:t>
                 </a:r>
               </a:p>
               <a:p>
@@ -5103,7 +5082,7 @@
                               <a:solidFill>
                                 <a:schemeClr val="accent5"/>
                               </a:solidFill>
-                              <a:latin typeface="Cambria Math" charset="0"/>
+                              <a:latin typeface="Cambria Math" panose="02040503050406030204" pitchFamily="18" charset="0"/>
                               <a:ea typeface="Consolas" charset="0"/>
                               <a:cs typeface="Consolas" charset="0"/>
                             </a:rPr>
@@ -5118,7 +5097,7 @@
                                   <a:solidFill>
                                     <a:schemeClr val="accent5"/>
                                   </a:solidFill>
-                                  <a:latin typeface="Cambria Math" charset="0"/>
+                                  <a:latin typeface="Cambria Math" panose="02040503050406030204" pitchFamily="18" charset="0"/>
                                   <a:ea typeface="Consolas" charset="0"/>
                                   <a:cs typeface="Consolas" charset="0"/>
                                 </a:rPr>
@@ -5172,7 +5151,7 @@
                               <a:solidFill>
                                 <a:schemeClr val="accent5"/>
                               </a:solidFill>
-                              <a:latin typeface="Cambria Math" charset="0"/>
+                              <a:latin typeface="Cambria Math" panose="02040503050406030204" pitchFamily="18" charset="0"/>
                               <a:ea typeface="Consolas" charset="0"/>
                               <a:cs typeface="Consolas" charset="0"/>
                             </a:rPr>
@@ -5187,7 +5166,7 @@
                                   <a:solidFill>
                                     <a:schemeClr val="accent5"/>
                                   </a:solidFill>
-                                  <a:latin typeface="Cambria Math" charset="0"/>
+                                  <a:latin typeface="Cambria Math" panose="02040503050406030204" pitchFamily="18" charset="0"/>
                                   <a:ea typeface="Consolas" charset="0"/>
                                   <a:cs typeface="Consolas" charset="0"/>
                                 </a:rPr>
@@ -5204,7 +5183,7 @@
                                       <a:solidFill>
                                         <a:schemeClr val="accent5"/>
                                       </a:solidFill>
-                                      <a:latin typeface="Cambria Math" charset="0"/>
+                                      <a:latin typeface="Cambria Math" panose="02040503050406030204" pitchFamily="18" charset="0"/>
                                       <a:ea typeface="Consolas" charset="0"/>
                                       <a:cs typeface="Consolas" charset="0"/>
                                     </a:rPr>
@@ -5220,7 +5199,7 @@
                                           <a:solidFill>
                                             <a:schemeClr val="accent5"/>
                                           </a:solidFill>
-                                          <a:latin typeface="Cambria Math" charset="0"/>
+                                          <a:latin typeface="Cambria Math" panose="02040503050406030204" pitchFamily="18" charset="0"/>
                                           <a:ea typeface="Consolas" charset="0"/>
                                           <a:cs typeface="Consolas" charset="0"/>
                                         </a:rPr>
@@ -5234,7 +5213,7 @@
                                               <a:solidFill>
                                                 <a:schemeClr val="accent5"/>
                                               </a:solidFill>
-                                              <a:latin typeface="Cambria Math" charset="0"/>
+                                              <a:latin typeface="Cambria Math" panose="02040503050406030204" pitchFamily="18" charset="0"/>
                                               <a:ea typeface="Consolas" charset="0"/>
                                               <a:cs typeface="Consolas" charset="0"/>
                                             </a:rPr>
@@ -5329,7 +5308,7 @@
                               <a:solidFill>
                                 <a:schemeClr val="accent5"/>
                               </a:solidFill>
-                              <a:latin typeface="Cambria Math" charset="0"/>
+                              <a:latin typeface="Cambria Math" panose="02040503050406030204" pitchFamily="18" charset="0"/>
                               <a:ea typeface="Consolas" charset="0"/>
                               <a:cs typeface="Consolas" charset="0"/>
                             </a:rPr>
@@ -5344,7 +5323,7 @@
                                   <a:solidFill>
                                     <a:schemeClr val="accent5"/>
                                   </a:solidFill>
-                                  <a:latin typeface="Cambria Math" charset="0"/>
+                                  <a:latin typeface="Cambria Math" panose="02040503050406030204" pitchFamily="18" charset="0"/>
                                   <a:ea typeface="Consolas" charset="0"/>
                                   <a:cs typeface="Consolas" charset="0"/>
                                 </a:rPr>
@@ -5398,7 +5377,7 @@
                               <a:solidFill>
                                 <a:schemeClr val="accent5"/>
                               </a:solidFill>
-                              <a:latin typeface="Cambria Math" charset="0"/>
+                              <a:latin typeface="Cambria Math" panose="02040503050406030204" pitchFamily="18" charset="0"/>
                               <a:ea typeface="Consolas" charset="0"/>
                               <a:cs typeface="Consolas" charset="0"/>
                             </a:rPr>
@@ -5450,15 +5429,7 @@
                     <a:ea typeface="Consolas" charset="0"/>
                     <a:cs typeface="Consolas" charset="0"/>
                   </a:rPr>
-                  <a:t>In a SAMPLE: called “</a:t>
-                </a:r>
-                <a:r>
-                  <a:rPr lang="en-US" sz="1600" dirty="0" smtClean="0">
-                    <a:latin typeface="Consolas" charset="0"/>
-                    <a:ea typeface="Consolas" charset="0"/>
-                    <a:cs typeface="Consolas" charset="0"/>
-                  </a:rPr>
-                  <a:t>s”</a:t>
+                  <a:t>In a SAMPLE: called “s”</a:t>
                 </a:r>
               </a:p>
               <a:p>
@@ -5512,7 +5483,7 @@
                               <a:solidFill>
                                 <a:schemeClr val="accent5"/>
                               </a:solidFill>
-                              <a:latin typeface="Cambria Math" charset="0"/>
+                              <a:latin typeface="Cambria Math" panose="02040503050406030204" pitchFamily="18" charset="0"/>
                               <a:ea typeface="Consolas" charset="0"/>
                               <a:cs typeface="Consolas" charset="0"/>
                             </a:rPr>
@@ -5527,7 +5498,7 @@
                                   <a:solidFill>
                                     <a:schemeClr val="accent5"/>
                                   </a:solidFill>
-                                  <a:latin typeface="Cambria Math" charset="0"/>
+                                  <a:latin typeface="Cambria Math" panose="02040503050406030204" pitchFamily="18" charset="0"/>
                                   <a:ea typeface="Consolas" charset="0"/>
                                   <a:cs typeface="Consolas" charset="0"/>
                                 </a:rPr>
@@ -5581,7 +5552,7 @@
                               <a:solidFill>
                                 <a:schemeClr val="accent5"/>
                               </a:solidFill>
-                              <a:latin typeface="Cambria Math" charset="0"/>
+                              <a:latin typeface="Cambria Math" panose="02040503050406030204" pitchFamily="18" charset="0"/>
                               <a:ea typeface="Consolas" charset="0"/>
                               <a:cs typeface="Consolas" charset="0"/>
                             </a:rPr>
@@ -5596,7 +5567,7 @@
                                   <a:solidFill>
                                     <a:schemeClr val="accent5"/>
                                   </a:solidFill>
-                                  <a:latin typeface="Cambria Math" charset="0"/>
+                                  <a:latin typeface="Cambria Math" panose="02040503050406030204" pitchFamily="18" charset="0"/>
                                   <a:ea typeface="Consolas" charset="0"/>
                                   <a:cs typeface="Consolas" charset="0"/>
                                 </a:rPr>
@@ -5613,7 +5584,7 @@
                                       <a:solidFill>
                                         <a:schemeClr val="accent5"/>
                                       </a:solidFill>
-                                      <a:latin typeface="Cambria Math" charset="0"/>
+                                      <a:latin typeface="Cambria Math" panose="02040503050406030204" pitchFamily="18" charset="0"/>
                                       <a:ea typeface="Consolas" charset="0"/>
                                       <a:cs typeface="Consolas" charset="0"/>
                                     </a:rPr>
@@ -5629,7 +5600,7 @@
                                           <a:solidFill>
                                             <a:schemeClr val="accent5"/>
                                           </a:solidFill>
-                                          <a:latin typeface="Cambria Math" charset="0"/>
+                                          <a:latin typeface="Cambria Math" panose="02040503050406030204" pitchFamily="18" charset="0"/>
                                           <a:ea typeface="Consolas" charset="0"/>
                                           <a:cs typeface="Consolas" charset="0"/>
                                         </a:rPr>
@@ -5643,7 +5614,7 @@
                                               <a:solidFill>
                                                 <a:schemeClr val="accent5"/>
                                               </a:solidFill>
-                                              <a:latin typeface="Cambria Math" charset="0"/>
+                                              <a:latin typeface="Cambria Math" panose="02040503050406030204" pitchFamily="18" charset="0"/>
                                               <a:ea typeface="Consolas" charset="0"/>
                                               <a:cs typeface="Consolas" charset="0"/>
                                             </a:rPr>
@@ -5695,7 +5666,7 @@
                                               <a:solidFill>
                                                 <a:schemeClr val="accent5"/>
                                               </a:solidFill>
-                                              <a:latin typeface="Cambria Math" charset="0"/>
+                                              <a:latin typeface="Cambria Math" panose="02040503050406030204" pitchFamily="18" charset="0"/>
                                               <a:ea typeface="Consolas" charset="0"/>
                                               <a:cs typeface="Consolas" charset="0"/>
                                             </a:rPr>
@@ -5766,7 +5737,7 @@
                               <a:solidFill>
                                 <a:schemeClr val="accent5"/>
                               </a:solidFill>
-                              <a:latin typeface="Cambria Math" charset="0"/>
+                              <a:latin typeface="Cambria Math" panose="02040503050406030204" pitchFamily="18" charset="0"/>
                               <a:ea typeface="Consolas" charset="0"/>
                               <a:cs typeface="Consolas" charset="0"/>
                             </a:rPr>
@@ -5781,7 +5752,7 @@
                                   <a:solidFill>
                                     <a:schemeClr val="accent5"/>
                                   </a:solidFill>
-                                  <a:latin typeface="Cambria Math" charset="0"/>
+                                  <a:latin typeface="Cambria Math" panose="02040503050406030204" pitchFamily="18" charset="0"/>
                                   <a:ea typeface="Consolas" charset="0"/>
                                   <a:cs typeface="Consolas" charset="0"/>
                                 </a:rPr>
@@ -5846,7 +5817,7 @@
                               <a:solidFill>
                                 <a:schemeClr val="accent5"/>
                               </a:solidFill>
-                              <a:latin typeface="Cambria Math" charset="0"/>
+                              <a:latin typeface="Cambria Math" panose="02040503050406030204" pitchFamily="18" charset="0"/>
                               <a:ea typeface="Consolas" charset="0"/>
                               <a:cs typeface="Consolas" charset="0"/>
                             </a:rPr>
@@ -5882,7 +5853,7 @@
             </p:txBody>
           </p:sp>
         </mc:Choice>
-        <mc:Fallback>
+        <mc:Fallback xmlns="">
           <p:sp>
             <p:nvSpPr>
               <p:cNvPr id="6" name="Content Placeholder 2"/>

</xml_diff>